<commit_message>
adiciona link json slide 4
</commit_message>
<xml_diff>
--- a/dadosmg3.pptx
+++ b/dadosmg3.pptx
@@ -8445,20 +8445,29 @@
               <a:t>arquivo em formato </a:t>
             </a:r>
             <a:r>
-              <a:rPr lang="pt-BR" dirty="0" err="1">
-                <a:solidFill>
-                  <a:srgbClr val="172B4D"/>
-                </a:solidFill>
+              <a:rPr lang="pt-BR" dirty="0" smtClean="0">
+                <a:solidFill>
+                  <a:srgbClr val="172B4D"/>
+                </a:solidFill>
+                <a:hlinkClick r:id="rId3"/>
               </a:rPr>
               <a:t>json</a:t>
             </a:r>
             <a:r>
+              <a:rPr lang="pt-BR" dirty="0" smtClean="0">
+                <a:solidFill>
+                  <a:srgbClr val="172B4D"/>
+                </a:solidFill>
+              </a:rPr>
+              <a:t> </a:t>
+            </a:r>
+            <a:r>
               <a:rPr lang="pt-BR" dirty="0">
                 <a:solidFill>
                   <a:srgbClr val="172B4D"/>
                 </a:solidFill>
               </a:rPr>
-              <a:t> que descreve:</a:t>
+              <a:t>que descreve:</a:t>
             </a:r>
           </a:p>
           <a:p>
@@ -8574,7 +8583,7 @@
               <a:solidFill>
                 <a:srgbClr val="172B4D"/>
               </a:solidFill>
-              <a:hlinkClick r:id="rId3"/>
+              <a:hlinkClick r:id="rId4"/>
             </a:endParaRPr>
           </a:p>
           <a:p>
@@ -8587,7 +8596,7 @@
                 <a:solidFill>
                   <a:srgbClr val="172B4D"/>
                 </a:solidFill>
-                <a:hlinkClick r:id="rId3"/>
+                <a:hlinkClick r:id="rId4"/>
               </a:rPr>
               <a:t>Decreto </a:t>
             </a:r>
@@ -8596,7 +8605,7 @@
                 <a:solidFill>
                   <a:srgbClr val="172B4D"/>
                 </a:solidFill>
-                <a:hlinkClick r:id="rId3"/>
+                <a:hlinkClick r:id="rId4"/>
               </a:rPr>
               <a:t>Federal 8777/2016</a:t>
             </a:r>
@@ -8678,7 +8687,7 @@
                 <a:solidFill>
                   <a:srgbClr val="172B4D"/>
                 </a:solidFill>
-                <a:hlinkClick r:id="rId4"/>
+                <a:hlinkClick r:id="rId5"/>
               </a:rPr>
               <a:t>Compras Emergenciais </a:t>
             </a:r>
@@ -8687,7 +8696,7 @@
                 <a:solidFill>
                   <a:srgbClr val="172B4D"/>
                 </a:solidFill>
-                <a:hlinkClick r:id="rId4"/>
+                <a:hlinkClick r:id="rId5"/>
               </a:rPr>
               <a:t>COVID</a:t>
             </a:r>
@@ -8734,7 +8743,7 @@
                 <a:solidFill>
                   <a:srgbClr val="172B4D"/>
                 </a:solidFill>
-                <a:hlinkClick r:id="rId5"/>
+                <a:hlinkClick r:id="rId6"/>
               </a:rPr>
               <a:t>alternativas para representação de endereço</a:t>
             </a:r>

</xml_diff>